<commit_message>
minor changes and improvements, mainly related to Runs_summary
</commit_message>
<xml_diff>
--- a/June2017/ExploringEi400.pptx
+++ b/June2017/ExploringEi400.pptx
@@ -7,6 +7,8 @@
   <p:sldIdLst>
     <p:sldId id="256" r:id="rId2"/>
     <p:sldId id="257" r:id="rId3"/>
+    <p:sldId id="258" r:id="rId4"/>
+    <p:sldId id="259" r:id="rId5"/>
   </p:sldIdLst>
   <p:sldSz cx="9144000" cy="6858000" type="screen4x3"/>
   <p:notesSz cx="6794500" cy="9906000"/>
@@ -3364,6 +3366,191 @@
     <p:extLst>
       <p:ext uri="{BB962C8B-B14F-4D97-AF65-F5344CB8AC3E}">
         <p14:creationId xmlns:p14="http://schemas.microsoft.com/office/powerpoint/2010/main" val="3813871919"/>
+      </p:ext>
+    </p:extLst>
+  </p:cSld>
+  <p:clrMapOvr>
+    <a:masterClrMapping/>
+  </p:clrMapOvr>
+</p:sld>
+</file>
+
+<file path=ppt/slides/slide3.xml><?xml version="1.0" encoding="utf-8"?>
+<p:sld xmlns:a="http://schemas.openxmlformats.org/drawingml/2006/main" xmlns:r="http://schemas.openxmlformats.org/officeDocument/2006/relationships" xmlns:p="http://schemas.openxmlformats.org/presentationml/2006/main">
+  <p:cSld>
+    <p:spTree>
+      <p:nvGrpSpPr>
+        <p:cNvPr id="1" name=""/>
+        <p:cNvGrpSpPr/>
+        <p:nvPr/>
+      </p:nvGrpSpPr>
+      <p:grpSpPr>
+        <a:xfrm>
+          <a:off x="0" y="0"/>
+          <a:ext cx="0" cy="0"/>
+          <a:chOff x="0" y="0"/>
+          <a:chExt cx="0" cy="0"/>
+        </a:xfrm>
+      </p:grpSpPr>
+      <p:sp>
+        <p:nvSpPr>
+          <p:cNvPr id="2" name="Title 1"/>
+          <p:cNvSpPr>
+            <a:spLocks noGrp="1"/>
+          </p:cNvSpPr>
+          <p:nvPr>
+            <p:ph type="title"/>
+          </p:nvPr>
+        </p:nvSpPr>
+        <p:spPr/>
+        <p:txBody>
+          <a:bodyPr/>
+          <a:lstStyle/>
+          <a:p>
+            <a:r>
+              <a:rPr lang="en-GB" dirty="0" smtClean="0"/>
+              <a:t>Alignment map</a:t>
+            </a:r>
+            <a:endParaRPr lang="en-GB" dirty="0"/>
+          </a:p>
+        </p:txBody>
+      </p:sp>
+      <p:sp>
+        <p:nvSpPr>
+          <p:cNvPr id="3" name="Content Placeholder 2"/>
+          <p:cNvSpPr>
+            <a:spLocks noGrp="1"/>
+          </p:cNvSpPr>
+          <p:nvPr>
+            <p:ph idx="1"/>
+          </p:nvPr>
+        </p:nvSpPr>
+        <p:spPr/>
+        <p:txBody>
+          <a:bodyPr/>
+          <a:lstStyle/>
+          <a:p>
+            <a:endParaRPr lang="en-GB"/>
+          </a:p>
+        </p:txBody>
+      </p:sp>
+      <p:pic>
+        <p:nvPicPr>
+          <p:cNvPr id="4" name="Picture 3"/>
+          <p:cNvPicPr>
+            <a:picLocks noChangeAspect="1"/>
+          </p:cNvPicPr>
+          <p:nvPr/>
+        </p:nvPicPr>
+        <p:blipFill>
+          <a:blip r:embed="rId2" cstate="print">
+            <a:extLst>
+              <a:ext uri="{28A0092B-C50C-407E-A947-70E740481C1C}">
+                <a14:useLocalDpi xmlns:a14="http://schemas.microsoft.com/office/drawing/2010/main" val="0"/>
+              </a:ext>
+            </a:extLst>
+          </a:blip>
+          <a:stretch>
+            <a:fillRect/>
+          </a:stretch>
+        </p:blipFill>
+        <p:spPr>
+          <a:xfrm>
+            <a:off x="106107" y="1083105"/>
+            <a:ext cx="9116164" cy="5774895"/>
+          </a:xfrm>
+          <a:prstGeom prst="rect">
+            <a:avLst/>
+          </a:prstGeom>
+        </p:spPr>
+      </p:pic>
+    </p:spTree>
+    <p:extLst>
+      <p:ext uri="{BB962C8B-B14F-4D97-AF65-F5344CB8AC3E}">
+        <p14:creationId xmlns:p14="http://schemas.microsoft.com/office/powerpoint/2010/main" val="73229069"/>
+      </p:ext>
+    </p:extLst>
+  </p:cSld>
+  <p:clrMapOvr>
+    <a:masterClrMapping/>
+  </p:clrMapOvr>
+</p:sld>
+</file>
+
+<file path=ppt/slides/slide4.xml><?xml version="1.0" encoding="utf-8"?>
+<p:sld xmlns:a="http://schemas.openxmlformats.org/drawingml/2006/main" xmlns:r="http://schemas.openxmlformats.org/officeDocument/2006/relationships" xmlns:p="http://schemas.openxmlformats.org/presentationml/2006/main">
+  <p:cSld>
+    <p:spTree>
+      <p:nvGrpSpPr>
+        <p:cNvPr id="1" name=""/>
+        <p:cNvGrpSpPr/>
+        <p:nvPr/>
+      </p:nvGrpSpPr>
+      <p:grpSpPr>
+        <a:xfrm>
+          <a:off x="0" y="0"/>
+          <a:ext cx="0" cy="0"/>
+          <a:chOff x="0" y="0"/>
+          <a:chExt cx="0" cy="0"/>
+        </a:xfrm>
+      </p:grpSpPr>
+      <p:sp>
+        <p:nvSpPr>
+          <p:cNvPr id="2" name="Title 1"/>
+          <p:cNvSpPr>
+            <a:spLocks noGrp="1"/>
+          </p:cNvSpPr>
+          <p:nvPr>
+            <p:ph type="title"/>
+          </p:nvPr>
+        </p:nvSpPr>
+        <p:spPr/>
+        <p:txBody>
+          <a:bodyPr/>
+          <a:lstStyle/>
+          <a:p>
+            <a:r>
+              <a:rPr lang="en-GB" dirty="0" smtClean="0"/>
+              <a:t>Alignment 19 cuts</a:t>
+            </a:r>
+            <a:endParaRPr lang="en-GB" dirty="0"/>
+          </a:p>
+        </p:txBody>
+      </p:sp>
+      <p:pic>
+        <p:nvPicPr>
+          <p:cNvPr id="4" name="Picture 3"/>
+          <p:cNvPicPr>
+            <a:picLocks noChangeAspect="1"/>
+          </p:cNvPicPr>
+          <p:nvPr/>
+        </p:nvPicPr>
+        <p:blipFill>
+          <a:blip r:embed="rId2">
+            <a:extLst>
+              <a:ext uri="{28A0092B-C50C-407E-A947-70E740481C1C}">
+                <a14:useLocalDpi xmlns:a14="http://schemas.microsoft.com/office/drawing/2010/main" val="0"/>
+              </a:ext>
+            </a:extLst>
+          </a:blip>
+          <a:stretch>
+            <a:fillRect/>
+          </a:stretch>
+        </p:blipFill>
+        <p:spPr>
+          <a:xfrm>
+            <a:off x="323528" y="1340768"/>
+            <a:ext cx="8712968" cy="5356870"/>
+          </a:xfrm>
+          <a:prstGeom prst="rect">
+            <a:avLst/>
+          </a:prstGeom>
+        </p:spPr>
+      </p:pic>
+    </p:spTree>
+    <p:extLst>
+      <p:ext uri="{BB962C8B-B14F-4D97-AF65-F5344CB8AC3E}">
+        <p14:creationId xmlns:p14="http://schemas.microsoft.com/office/powerpoint/2010/main" val="3666887218"/>
       </p:ext>
     </p:extLst>
   </p:cSld>

</xml_diff>